<commit_message>
add and edit files
</commit_message>
<xml_diff>
--- a/m1/task13.1/DEPLOY TELEGRAMM BOT.pptx
+++ b/m1/task13.1/DEPLOY TELEGRAMM BOT.pptx
@@ -17,6 +17,7 @@
     <p:sldId id="265" r:id="rId11"/>
     <p:sldId id="264" r:id="rId12"/>
     <p:sldId id="266" r:id="rId13"/>
+    <p:sldId id="268" r:id="rId14"/>
   </p:sldIdLst>
   <p:sldSz cx="12192000" cy="6858000"/>
   <p:notesSz cx="6858000" cy="9144000"/>
@@ -8838,61 +8839,61 @@
     </dgm:pt>
   </dgm:ptLst>
   <dgm:cxnLst>
-    <dgm:cxn modelId="{098EA7E0-C90D-40A0-B695-C120175F3C7E}" srcId="{8A2ADFF1-ECFC-4CE2-8A43-3E5393E9CA78}" destId="{2044B8BC-4BE9-4921-85E0-184354AEE613}" srcOrd="3" destOrd="0" parTransId="{1F93CCE8-4EAA-409D-B03E-40017104DC0E}" sibTransId="{42091AC8-AC55-4BCF-9654-AD5041BC2E4B}"/>
+    <dgm:cxn modelId="{3AA96478-916E-4D50-90AC-570B5333F4C7}" type="presOf" srcId="{AD124901-5198-4D50-A3F9-8BE5ADB951C7}" destId="{AB6B1CF3-3262-47B0-85F5-50E7EC304561}" srcOrd="0" destOrd="0" presId="urn:microsoft.com/office/officeart/2005/8/layout/hierarchy3"/>
+    <dgm:cxn modelId="{47DC1FE2-8990-4504-B026-C68A21CBBD0F}" type="presOf" srcId="{99208F80-8297-46D6-9DE5-87AE02B48845}" destId="{4A2DBB50-DE27-4A15-BBE2-F762735D8066}" srcOrd="0" destOrd="0" presId="urn:microsoft.com/office/officeart/2005/8/layout/hierarchy3"/>
     <dgm:cxn modelId="{6127FFC5-CD4E-4706-B3CC-974279977171}" type="presOf" srcId="{6BD02D9C-545C-48CB-9CCD-8C5D02D77871}" destId="{677F29EB-CE17-4F5A-9052-71C883FDEFF6}" srcOrd="0" destOrd="0" presId="urn:microsoft.com/office/officeart/2005/8/layout/hierarchy3"/>
-    <dgm:cxn modelId="{85BE9176-0593-418E-99FC-F5440A9734E8}" type="presOf" srcId="{3F4673CF-9B3B-4509-97DD-A22B66C3824F}" destId="{71329461-93C5-41F5-B8FC-F4F00F55BDD8}" srcOrd="0" destOrd="0" presId="urn:microsoft.com/office/officeart/2005/8/layout/hierarchy3"/>
-    <dgm:cxn modelId="{A818039E-D8FD-4EDB-985F-F29ABBAC9BB8}" type="presOf" srcId="{9F14C13A-6FC2-4D98-AE2D-9A93C207FDC4}" destId="{D9D4AE9F-37E5-4EBD-8674-E21CB41E48EA}" srcOrd="0" destOrd="0" presId="urn:microsoft.com/office/officeart/2005/8/layout/hierarchy3"/>
-    <dgm:cxn modelId="{F2142D95-F096-4F27-B771-0098AE724F37}" type="presOf" srcId="{CC65F3DC-6B4F-4534-8DAE-7A1C12ACFFF7}" destId="{30E908C8-6E65-4A17-AA58-CAE858D780FB}" srcOrd="1" destOrd="0" presId="urn:microsoft.com/office/officeart/2005/8/layout/hierarchy3"/>
-    <dgm:cxn modelId="{0077A587-E164-4D28-9591-DAC23E52DC43}" type="presOf" srcId="{1F0D7478-45F7-470E-8F78-E3E2686DB277}" destId="{7578405C-E23C-4E59-8827-0E3DE5F1E7CB}" srcOrd="0" destOrd="0" presId="urn:microsoft.com/office/officeart/2005/8/layout/hierarchy3"/>
-    <dgm:cxn modelId="{6D23D214-231B-487F-B349-B4AD150F8A0E}" type="presOf" srcId="{483F5A5F-33E6-4053-81AF-E94287B568DB}" destId="{BCBCFE84-3839-4C84-BC95-9CA87DE4C7C3}" srcOrd="0" destOrd="0" presId="urn:microsoft.com/office/officeart/2005/8/layout/hierarchy3"/>
-    <dgm:cxn modelId="{3AA96478-916E-4D50-90AC-570B5333F4C7}" type="presOf" srcId="{AD124901-5198-4D50-A3F9-8BE5ADB951C7}" destId="{AB6B1CF3-3262-47B0-85F5-50E7EC304561}" srcOrd="0" destOrd="0" presId="urn:microsoft.com/office/officeart/2005/8/layout/hierarchy3"/>
-    <dgm:cxn modelId="{BE090377-1A6A-420D-840D-CD48EA65F706}" type="presOf" srcId="{BAA65B25-B323-4C9B-AE7B-496EBE82415A}" destId="{779FDC80-F642-40ED-9DE1-86745C492C32}" srcOrd="0" destOrd="0" presId="urn:microsoft.com/office/officeart/2005/8/layout/hierarchy3"/>
-    <dgm:cxn modelId="{06046B43-F136-4DB9-978A-2D9E346AFA7A}" type="presOf" srcId="{9AA46DBE-102B-43BE-99EA-AD0C8020ACBA}" destId="{EC502B73-1D0E-4066-9047-1F0C0B121FCE}" srcOrd="0" destOrd="0" presId="urn:microsoft.com/office/officeart/2005/8/layout/hierarchy3"/>
+    <dgm:cxn modelId="{FB292193-D772-4344-8926-C42E08579516}" type="presOf" srcId="{20865375-55FE-4D88-A158-C89D8F2F9CC9}" destId="{AE01620F-C909-41D4-8C6A-888D8F557642}" srcOrd="0" destOrd="0" presId="urn:microsoft.com/office/officeart/2005/8/layout/hierarchy3"/>
+    <dgm:cxn modelId="{34BC3A3E-D140-45A9-AF28-9A46D60AE3A4}" type="presOf" srcId="{CF6FF724-7BB1-4521-A866-D9EE077282AD}" destId="{628B5E8D-4F96-4246-A937-2CEF00EF2D9C}" srcOrd="0" destOrd="0" presId="urn:microsoft.com/office/officeart/2005/8/layout/hierarchy3"/>
+    <dgm:cxn modelId="{3728D680-8635-4746-804D-0CFF957E1E1F}" type="presOf" srcId="{78A695BB-F21E-4EC9-9686-793E406DF3A4}" destId="{D34B5699-D55F-4F8B-B13B-26D3EC131D3E}" srcOrd="0" destOrd="0" presId="urn:microsoft.com/office/officeart/2005/8/layout/hierarchy3"/>
+    <dgm:cxn modelId="{8F4EB4DD-301B-47D3-A337-7B13ADD03D9F}" type="presOf" srcId="{14139A94-D344-4127-9450-85BD389BCCFA}" destId="{FC7DC23C-5289-4929-908E-E508E064E8A9}" srcOrd="0" destOrd="0" presId="urn:microsoft.com/office/officeart/2005/8/layout/hierarchy3"/>
+    <dgm:cxn modelId="{5952A636-7869-4C33-8124-EB5CE378CAAD}" type="presOf" srcId="{8A2ADFF1-ECFC-4CE2-8A43-3E5393E9CA78}" destId="{B71426A2-5D08-4695-9DB8-F4830DAE19B4}" srcOrd="0" destOrd="0" presId="urn:microsoft.com/office/officeart/2005/8/layout/hierarchy3"/>
     <dgm:cxn modelId="{AC34EB8E-BCFA-4198-8FB0-D823C187BD29}" type="presOf" srcId="{BB527F04-0AA1-439B-92FB-8427C3A8E8F8}" destId="{B4A344B5-BD89-4125-88C5-62E68C9FE338}" srcOrd="0" destOrd="0" presId="urn:microsoft.com/office/officeart/2005/8/layout/hierarchy3"/>
-    <dgm:cxn modelId="{6EE39E3B-436F-445D-8EF2-18C9E2F0FE87}" type="presOf" srcId="{9AA46DBE-102B-43BE-99EA-AD0C8020ACBA}" destId="{3A82C7D5-D555-46AC-8371-E17A4E588E45}" srcOrd="1" destOrd="0" presId="urn:microsoft.com/office/officeart/2005/8/layout/hierarchy3"/>
-    <dgm:cxn modelId="{CE6F1BE8-4FDB-4596-8B50-FF39C2DFE00B}" srcId="{8A2ADFF1-ECFC-4CE2-8A43-3E5393E9CA78}" destId="{CC65F3DC-6B4F-4534-8DAE-7A1C12ACFFF7}" srcOrd="0" destOrd="0" parTransId="{27A3EB24-5F9E-4A53-8E53-A4554769440E}" sibTransId="{3522F293-DD45-4292-9AFA-2F89269AA284}"/>
+    <dgm:cxn modelId="{F40C2093-2CE1-4BF7-B261-02F66B0BB279}" type="presOf" srcId="{A1C29EDB-36D9-4D7D-8833-F6FEE36AB395}" destId="{6C224533-A8EA-490D-A1A9-E747AD688459}" srcOrd="0" destOrd="0" presId="urn:microsoft.com/office/officeart/2005/8/layout/hierarchy3"/>
+    <dgm:cxn modelId="{5FBF5D18-ABAC-41E2-8AD0-5E4EB3AC2613}" type="presOf" srcId="{662E6787-133E-44DE-AFB1-2EE48CED900E}" destId="{32FCEF30-241C-4A4B-B2A5-A542C2FDA6FA}" srcOrd="0" destOrd="0" presId="urn:microsoft.com/office/officeart/2005/8/layout/hierarchy3"/>
+    <dgm:cxn modelId="{6C4668CF-A6C1-4F90-B0E7-B7B08ADAD1B8}" type="presOf" srcId="{A4B71636-E8F3-4FE3-B960-84209B4D8D49}" destId="{01404DA1-4B6B-4D88-B729-4EB65C080AEB}" srcOrd="0" destOrd="0" presId="urn:microsoft.com/office/officeart/2005/8/layout/hierarchy3"/>
+    <dgm:cxn modelId="{7D1EF343-A334-4E05-91EF-49F73665A73B}" srcId="{8A2ADFF1-ECFC-4CE2-8A43-3E5393E9CA78}" destId="{9AA46DBE-102B-43BE-99EA-AD0C8020ACBA}" srcOrd="4" destOrd="0" parTransId="{9FEBE1C5-ECB9-432F-8C59-2760D9804B0F}" sibTransId="{94AA3C68-CE5E-4BC6-8F20-8DD4A6CE690B}"/>
+    <dgm:cxn modelId="{A2D74A94-630F-4FD1-871D-72550A11A625}" type="presOf" srcId="{FA48EDC7-D956-466E-9D0A-B85785DF45A4}" destId="{6D432BDD-A9CA-47AC-A00A-7AE9F0834888}" srcOrd="0" destOrd="0" presId="urn:microsoft.com/office/officeart/2005/8/layout/hierarchy3"/>
+    <dgm:cxn modelId="{F8553A95-B367-450B-AAFB-00B35E9E2F54}" srcId="{CC65F3DC-6B4F-4534-8DAE-7A1C12ACFFF7}" destId="{CF6FF724-7BB1-4521-A866-D9EE077282AD}" srcOrd="1" destOrd="0" parTransId="{A1C29EDB-36D9-4D7D-8833-F6FEE36AB395}" sibTransId="{F2207054-4344-421B-A27B-0CD72934A799}"/>
+    <dgm:cxn modelId="{8D048F1E-8199-4951-853C-B8279D9ECCD9}" type="presOf" srcId="{31723623-2907-40BD-B4A4-97AC62D93EE0}" destId="{7B4592B8-D644-462B-BB83-9DBA4080A9C9}" srcOrd="0" destOrd="0" presId="urn:microsoft.com/office/officeart/2005/8/layout/hierarchy3"/>
+    <dgm:cxn modelId="{02522622-7317-4E87-9C02-66D83C87754D}" srcId="{3F4673CF-9B3B-4509-97DD-A22B66C3824F}" destId="{669FBD19-B57A-47FC-AF73-4AC78B12256A}" srcOrd="3" destOrd="0" parTransId="{E8BE41D3-7093-4518-AA3D-12C02C5533B3}" sibTransId="{E867F805-6193-4D6A-B0D0-6DEA3B43D2BB}"/>
+    <dgm:cxn modelId="{DD0F0C9F-E1AB-4BD3-92E6-DF786BDCE60E}" srcId="{2044B8BC-4BE9-4921-85E0-184354AEE613}" destId="{6504BF02-88E9-4F44-85EE-8080CFB2D5FD}" srcOrd="1" destOrd="0" parTransId="{31723623-2907-40BD-B4A4-97AC62D93EE0}" sibTransId="{E38F242A-98AD-4019-BBD9-2DE6BF830270}"/>
+    <dgm:cxn modelId="{598EBF17-5C67-43EC-947F-914DDF9806EF}" type="presOf" srcId="{A8BF65B2-971A-4FB1-84FF-B32C5A517CA6}" destId="{695E4BA9-9902-44F2-BE36-DD64A9BBB0CB}" srcOrd="0" destOrd="0" presId="urn:microsoft.com/office/officeart/2005/8/layout/hierarchy3"/>
+    <dgm:cxn modelId="{F4494392-1D4D-473C-A7EE-D2598D470353}" srcId="{78A695BB-F21E-4EC9-9686-793E406DF3A4}" destId="{662E6787-133E-44DE-AFB1-2EE48CED900E}" srcOrd="2" destOrd="0" parTransId="{9F14C13A-6FC2-4D98-AE2D-9A93C207FDC4}" sibTransId="{F2BB7FDE-186F-47DF-B22A-8ACA6E8361CB}"/>
     <dgm:cxn modelId="{9275CD13-BF8B-4707-8D55-21D57D1DE0FE}" type="presOf" srcId="{31D18493-A05B-44FA-B2AD-0F74FAFB372C}" destId="{CA38E029-A365-4840-B6AB-E2F6E896A60F}" srcOrd="0" destOrd="0" presId="urn:microsoft.com/office/officeart/2005/8/layout/hierarchy3"/>
     <dgm:cxn modelId="{01F3A91F-1E94-4647-82A9-F0F80175AE5E}" type="presOf" srcId="{15483F0D-B987-48C5-A922-9265109DD868}" destId="{D8906089-DEA4-459E-BC86-0406F3B3A060}" srcOrd="0" destOrd="0" presId="urn:microsoft.com/office/officeart/2005/8/layout/hierarchy3"/>
-    <dgm:cxn modelId="{F8553A95-B367-450B-AAFB-00B35E9E2F54}" srcId="{CC65F3DC-6B4F-4534-8DAE-7A1C12ACFFF7}" destId="{CF6FF724-7BB1-4521-A866-D9EE077282AD}" srcOrd="1" destOrd="0" parTransId="{A1C29EDB-36D9-4D7D-8833-F6FEE36AB395}" sibTransId="{F2207054-4344-421B-A27B-0CD72934A799}"/>
+    <dgm:cxn modelId="{EECC2B04-E1D4-4775-84BB-EEFD3E6BE457}" type="presOf" srcId="{6504BF02-88E9-4F44-85EE-8080CFB2D5FD}" destId="{87AEBA47-E91F-4D35-87F2-A87C9F675F79}" srcOrd="0" destOrd="0" presId="urn:microsoft.com/office/officeart/2005/8/layout/hierarchy3"/>
+    <dgm:cxn modelId="{06046B43-F136-4DB9-978A-2D9E346AFA7A}" type="presOf" srcId="{9AA46DBE-102B-43BE-99EA-AD0C8020ACBA}" destId="{EC502B73-1D0E-4066-9047-1F0C0B121FCE}" srcOrd="0" destOrd="0" presId="urn:microsoft.com/office/officeart/2005/8/layout/hierarchy3"/>
+    <dgm:cxn modelId="{AB541539-C8D1-4D23-BC66-D34AD61035C1}" type="presOf" srcId="{2044B8BC-4BE9-4921-85E0-184354AEE613}" destId="{9854BD13-45B8-4BD3-886D-2D076B31BDA4}" srcOrd="0" destOrd="0" presId="urn:microsoft.com/office/officeart/2005/8/layout/hierarchy3"/>
+    <dgm:cxn modelId="{CE6F1BE8-4FDB-4596-8B50-FF39C2DFE00B}" srcId="{8A2ADFF1-ECFC-4CE2-8A43-3E5393E9CA78}" destId="{CC65F3DC-6B4F-4534-8DAE-7A1C12ACFFF7}" srcOrd="0" destOrd="0" parTransId="{27A3EB24-5F9E-4A53-8E53-A4554769440E}" sibTransId="{3522F293-DD45-4292-9AFA-2F89269AA284}"/>
+    <dgm:cxn modelId="{D8DD534F-C13B-427F-B819-7B7F6E578851}" type="presOf" srcId="{8474DBC0-4762-444F-B4FD-01D6B61C322C}" destId="{B4F11050-7FC5-4AEB-9135-11FAFDCD3EDB}" srcOrd="0" destOrd="0" presId="urn:microsoft.com/office/officeart/2005/8/layout/hierarchy3"/>
+    <dgm:cxn modelId="{9AE6C1E3-92D4-447B-A13C-C327E4F7E129}" srcId="{78A695BB-F21E-4EC9-9686-793E406DF3A4}" destId="{FA48EDC7-D956-466E-9D0A-B85785DF45A4}" srcOrd="0" destOrd="0" parTransId="{A4B71636-E8F3-4FE3-B960-84209B4D8D49}" sibTransId="{DDC30FA1-CCA7-4F13-A4C7-407C3E1B04DF}"/>
+    <dgm:cxn modelId="{F2142D95-F096-4F27-B771-0098AE724F37}" type="presOf" srcId="{CC65F3DC-6B4F-4534-8DAE-7A1C12ACFFF7}" destId="{30E908C8-6E65-4A17-AA58-CAE858D780FB}" srcOrd="1" destOrd="0" presId="urn:microsoft.com/office/officeart/2005/8/layout/hierarchy3"/>
+    <dgm:cxn modelId="{85BE9176-0593-418E-99FC-F5440A9734E8}" type="presOf" srcId="{3F4673CF-9B3B-4509-97DD-A22B66C3824F}" destId="{71329461-93C5-41F5-B8FC-F4F00F55BDD8}" srcOrd="0" destOrd="0" presId="urn:microsoft.com/office/officeart/2005/8/layout/hierarchy3"/>
     <dgm:cxn modelId="{79FF1CBC-234A-4A81-B108-651636A80280}" srcId="{CC65F3DC-6B4F-4534-8DAE-7A1C12ACFFF7}" destId="{6BD02D9C-545C-48CB-9CCD-8C5D02D77871}" srcOrd="0" destOrd="0" parTransId="{A8BF65B2-971A-4FB1-84FF-B32C5A517CA6}" sibTransId="{25CDFB0A-A8EC-46C4-8DD0-B7059B3824A7}"/>
+    <dgm:cxn modelId="{670BC509-392B-405A-9253-7067CB537D5F}" type="presOf" srcId="{E8BE41D3-7093-4518-AA3D-12C02C5533B3}" destId="{F584080F-9707-4881-9387-4965BF18DBD4}" srcOrd="0" destOrd="0" presId="urn:microsoft.com/office/officeart/2005/8/layout/hierarchy3"/>
+    <dgm:cxn modelId="{6EE39E3B-436F-445D-8EF2-18C9E2F0FE87}" type="presOf" srcId="{9AA46DBE-102B-43BE-99EA-AD0C8020ACBA}" destId="{3A82C7D5-D555-46AC-8371-E17A4E588E45}" srcOrd="1" destOrd="0" presId="urn:microsoft.com/office/officeart/2005/8/layout/hierarchy3"/>
+    <dgm:cxn modelId="{D444824F-3A97-4C00-BF1A-ABEDF95204E0}" type="presOf" srcId="{A5DCF514-2A8A-4627-A19A-E67934107F5F}" destId="{48C06D2F-723A-4C73-9A80-49845654B909}" srcOrd="0" destOrd="0" presId="urn:microsoft.com/office/officeart/2005/8/layout/hierarchy3"/>
+    <dgm:cxn modelId="{CB79CC9C-588A-4CBD-AEC1-36DADCAC3C18}" type="presOf" srcId="{2044B8BC-4BE9-4921-85E0-184354AEE613}" destId="{E5267F8B-006B-49E3-9CD7-7225B82D891A}" srcOrd="1" destOrd="0" presId="urn:microsoft.com/office/officeart/2005/8/layout/hierarchy3"/>
+    <dgm:cxn modelId="{AE5FFBFA-E8F4-43ED-B0CC-BD38F3FC61E8}" type="presOf" srcId="{AD02BC3D-85A1-4FD1-B8BA-B6C453BDAD22}" destId="{D4A1399F-D691-4F03-8CE9-9438C4C91635}" srcOrd="0" destOrd="0" presId="urn:microsoft.com/office/officeart/2005/8/layout/hierarchy3"/>
+    <dgm:cxn modelId="{2E19CD03-B3AC-4E3D-A5C7-87B539AB5DE9}" srcId="{9AA46DBE-102B-43BE-99EA-AD0C8020ACBA}" destId="{8474DBC0-4762-444F-B4FD-01D6B61C322C}" srcOrd="0" destOrd="0" parTransId="{979C4618-D401-4827-9E28-71C511CFDBF0}" sibTransId="{4B41B8D2-0085-485A-A2DE-86C7882E9251}"/>
+    <dgm:cxn modelId="{098EA7E0-C90D-40A0-B695-C120175F3C7E}" srcId="{8A2ADFF1-ECFC-4CE2-8A43-3E5393E9CA78}" destId="{2044B8BC-4BE9-4921-85E0-184354AEE613}" srcOrd="3" destOrd="0" parTransId="{1F93CCE8-4EAA-409D-B03E-40017104DC0E}" sibTransId="{42091AC8-AC55-4BCF-9654-AD5041BC2E4B}"/>
+    <dgm:cxn modelId="{7FA8F6FD-932D-4C87-BC75-94BCD31DD751}" srcId="{3F4673CF-9B3B-4509-97DD-A22B66C3824F}" destId="{AD02BC3D-85A1-4FD1-B8BA-B6C453BDAD22}" srcOrd="1" destOrd="0" parTransId="{AD124901-5198-4D50-A3F9-8BE5ADB951C7}" sibTransId="{5F215F94-D3A9-405F-8A13-520CF9607BFB}"/>
+    <dgm:cxn modelId="{7BE61171-5591-4162-9345-02847A483D80}" srcId="{3F4673CF-9B3B-4509-97DD-A22B66C3824F}" destId="{15483F0D-B987-48C5-A922-9265109DD868}" srcOrd="2" destOrd="0" parTransId="{1F0D7478-45F7-470E-8F78-E3E2686DB277}" sibTransId="{077B4879-B76D-4951-B47E-28AA24DDCF35}"/>
+    <dgm:cxn modelId="{BE090377-1A6A-420D-840D-CD48EA65F706}" type="presOf" srcId="{BAA65B25-B323-4C9B-AE7B-496EBE82415A}" destId="{779FDC80-F642-40ED-9DE1-86745C492C32}" srcOrd="0" destOrd="0" presId="urn:microsoft.com/office/officeart/2005/8/layout/hierarchy3"/>
+    <dgm:cxn modelId="{F2293D03-BFF1-4A07-B3DC-97F28A771E9B}" srcId="{78A695BB-F21E-4EC9-9686-793E406DF3A4}" destId="{483F5A5F-33E6-4053-81AF-E94287B568DB}" srcOrd="1" destOrd="0" parTransId="{99208F80-8297-46D6-9DE5-87AE02B48845}" sibTransId="{3F49EDB9-470C-4BCD-A671-4A758C79B8CE}"/>
+    <dgm:cxn modelId="{0077A587-E164-4D28-9591-DAC23E52DC43}" type="presOf" srcId="{1F0D7478-45F7-470E-8F78-E3E2686DB277}" destId="{7578405C-E23C-4E59-8827-0E3DE5F1E7CB}" srcOrd="0" destOrd="0" presId="urn:microsoft.com/office/officeart/2005/8/layout/hierarchy3"/>
+    <dgm:cxn modelId="{1FE85BC8-443E-40E7-8CB4-53D17C13B33E}" type="presOf" srcId="{78A695BB-F21E-4EC9-9686-793E406DF3A4}" destId="{08056D84-147F-469A-B3B6-C5B375730299}" srcOrd="1" destOrd="0" presId="urn:microsoft.com/office/officeart/2005/8/layout/hierarchy3"/>
+    <dgm:cxn modelId="{BA10AF30-0369-4280-9E72-074CAB53D3AD}" type="presOf" srcId="{669FBD19-B57A-47FC-AF73-4AC78B12256A}" destId="{C3C76811-CC02-4B22-9559-E9FD4F30BEBA}" srcOrd="0" destOrd="0" presId="urn:microsoft.com/office/officeart/2005/8/layout/hierarchy3"/>
+    <dgm:cxn modelId="{3D6148D6-E580-44C1-9DA5-664D2879479D}" srcId="{3F4673CF-9B3B-4509-97DD-A22B66C3824F}" destId="{A5DCF514-2A8A-4627-A19A-E67934107F5F}" srcOrd="0" destOrd="0" parTransId="{BB527F04-0AA1-439B-92FB-8427C3A8E8F8}" sibTransId="{28774637-A124-4690-BA71-982CDADC1ACA}"/>
+    <dgm:cxn modelId="{07048D6A-A8D8-463D-9AE0-7097AA1A10B9}" srcId="{8A2ADFF1-ECFC-4CE2-8A43-3E5393E9CA78}" destId="{78A695BB-F21E-4EC9-9686-793E406DF3A4}" srcOrd="1" destOrd="0" parTransId="{4EEF19B1-1F31-4AC6-ACFC-F1E5F3CC4474}" sibTransId="{6DF913F1-C511-4422-A383-6485D22C8469}"/>
     <dgm:cxn modelId="{3F187AF8-4529-45B4-8E30-4BC5737549AF}" srcId="{78A695BB-F21E-4EC9-9686-793E406DF3A4}" destId="{20865375-55FE-4D88-A158-C89D8F2F9CC9}" srcOrd="3" destOrd="0" parTransId="{BAA65B25-B323-4C9B-AE7B-496EBE82415A}" sibTransId="{BBA586E2-FB67-4A51-9DFF-05EB7D099325}"/>
+    <dgm:cxn modelId="{BC642D7B-B0F4-491C-99A8-CC2DEA4B5D7F}" srcId="{8A2ADFF1-ECFC-4CE2-8A43-3E5393E9CA78}" destId="{3F4673CF-9B3B-4509-97DD-A22B66C3824F}" srcOrd="2" destOrd="0" parTransId="{9BFFFDD3-D7D9-47F0-9C62-268CF28FAC27}" sibTransId="{8B313A6A-5A13-4E81-9717-5A9FE2942BCC}"/>
+    <dgm:cxn modelId="{A92418FB-F5C5-432B-B761-FE4BC65475D1}" type="presOf" srcId="{CC65F3DC-6B4F-4534-8DAE-7A1C12ACFFF7}" destId="{1D8A01CF-79D9-425A-8D46-E0C2FCC5236C}" srcOrd="0" destOrd="0" presId="urn:microsoft.com/office/officeart/2005/8/layout/hierarchy3"/>
     <dgm:cxn modelId="{F25AE835-37DE-4DB4-B0EF-4F34EA676A86}" srcId="{2044B8BC-4BE9-4921-85E0-184354AEE613}" destId="{31D18493-A05B-44FA-B2AD-0F74FAFB372C}" srcOrd="0" destOrd="0" parTransId="{14139A94-D344-4127-9450-85BD389BCCFA}" sibTransId="{BD2D549E-9BEE-4F3F-AA50-9AB3AD931C59}"/>
-    <dgm:cxn modelId="{670BC509-392B-405A-9253-7067CB537D5F}" type="presOf" srcId="{E8BE41D3-7093-4518-AA3D-12C02C5533B3}" destId="{F584080F-9707-4881-9387-4965BF18DBD4}" srcOrd="0" destOrd="0" presId="urn:microsoft.com/office/officeart/2005/8/layout/hierarchy3"/>
-    <dgm:cxn modelId="{AE5FFBFA-E8F4-43ED-B0CC-BD38F3FC61E8}" type="presOf" srcId="{AD02BC3D-85A1-4FD1-B8BA-B6C453BDAD22}" destId="{D4A1399F-D691-4F03-8CE9-9438C4C91635}" srcOrd="0" destOrd="0" presId="urn:microsoft.com/office/officeart/2005/8/layout/hierarchy3"/>
-    <dgm:cxn modelId="{5FBF5D18-ABAC-41E2-8AD0-5E4EB3AC2613}" type="presOf" srcId="{662E6787-133E-44DE-AFB1-2EE48CED900E}" destId="{32FCEF30-241C-4A4B-B2A5-A542C2FDA6FA}" srcOrd="0" destOrd="0" presId="urn:microsoft.com/office/officeart/2005/8/layout/hierarchy3"/>
-    <dgm:cxn modelId="{02522622-7317-4E87-9C02-66D83C87754D}" srcId="{3F4673CF-9B3B-4509-97DD-A22B66C3824F}" destId="{669FBD19-B57A-47FC-AF73-4AC78B12256A}" srcOrd="3" destOrd="0" parTransId="{E8BE41D3-7093-4518-AA3D-12C02C5533B3}" sibTransId="{E867F805-6193-4D6A-B0D0-6DEA3B43D2BB}"/>
-    <dgm:cxn modelId="{07048D6A-A8D8-463D-9AE0-7097AA1A10B9}" srcId="{8A2ADFF1-ECFC-4CE2-8A43-3E5393E9CA78}" destId="{78A695BB-F21E-4EC9-9686-793E406DF3A4}" srcOrd="1" destOrd="0" parTransId="{4EEF19B1-1F31-4AC6-ACFC-F1E5F3CC4474}" sibTransId="{6DF913F1-C511-4422-A383-6485D22C8469}"/>
-    <dgm:cxn modelId="{FB292193-D772-4344-8926-C42E08579516}" type="presOf" srcId="{20865375-55FE-4D88-A158-C89D8F2F9CC9}" destId="{AE01620F-C909-41D4-8C6A-888D8F557642}" srcOrd="0" destOrd="0" presId="urn:microsoft.com/office/officeart/2005/8/layout/hierarchy3"/>
-    <dgm:cxn modelId="{8F4EB4DD-301B-47D3-A337-7B13ADD03D9F}" type="presOf" srcId="{14139A94-D344-4127-9450-85BD389BCCFA}" destId="{FC7DC23C-5289-4929-908E-E508E064E8A9}" srcOrd="0" destOrd="0" presId="urn:microsoft.com/office/officeart/2005/8/layout/hierarchy3"/>
-    <dgm:cxn modelId="{F2293D03-BFF1-4A07-B3DC-97F28A771E9B}" srcId="{78A695BB-F21E-4EC9-9686-793E406DF3A4}" destId="{483F5A5F-33E6-4053-81AF-E94287B568DB}" srcOrd="1" destOrd="0" parTransId="{99208F80-8297-46D6-9DE5-87AE02B48845}" sibTransId="{3F49EDB9-470C-4BCD-A671-4A758C79B8CE}"/>
-    <dgm:cxn modelId="{34BC3A3E-D140-45A9-AF28-9A46D60AE3A4}" type="presOf" srcId="{CF6FF724-7BB1-4521-A866-D9EE077282AD}" destId="{628B5E8D-4F96-4246-A937-2CEF00EF2D9C}" srcOrd="0" destOrd="0" presId="urn:microsoft.com/office/officeart/2005/8/layout/hierarchy3"/>
-    <dgm:cxn modelId="{D8DD534F-C13B-427F-B819-7B7F6E578851}" type="presOf" srcId="{8474DBC0-4762-444F-B4FD-01D6B61C322C}" destId="{B4F11050-7FC5-4AEB-9135-11FAFDCD3EDB}" srcOrd="0" destOrd="0" presId="urn:microsoft.com/office/officeart/2005/8/layout/hierarchy3"/>
+    <dgm:cxn modelId="{6D23D214-231B-487F-B349-B4AD150F8A0E}" type="presOf" srcId="{483F5A5F-33E6-4053-81AF-E94287B568DB}" destId="{BCBCFE84-3839-4C84-BC95-9CA87DE4C7C3}" srcOrd="0" destOrd="0" presId="urn:microsoft.com/office/officeart/2005/8/layout/hierarchy3"/>
+    <dgm:cxn modelId="{A818039E-D8FD-4EDB-985F-F29ABBAC9BB8}" type="presOf" srcId="{9F14C13A-6FC2-4D98-AE2D-9A93C207FDC4}" destId="{D9D4AE9F-37E5-4EBD-8674-E21CB41E48EA}" srcOrd="0" destOrd="0" presId="urn:microsoft.com/office/officeart/2005/8/layout/hierarchy3"/>
+    <dgm:cxn modelId="{5F9438F9-F165-456A-A4D5-02363B197DCE}" type="presOf" srcId="{979C4618-D401-4827-9E28-71C511CFDBF0}" destId="{7D787CB7-AF7D-4FED-AE72-AD01A99E42F3}" srcOrd="0" destOrd="0" presId="urn:microsoft.com/office/officeart/2005/8/layout/hierarchy3"/>
     <dgm:cxn modelId="{16A44A35-96F8-46A5-B0DC-8CE9A4379077}" type="presOf" srcId="{3F4673CF-9B3B-4509-97DD-A22B66C3824F}" destId="{D944460B-3329-4C23-912F-509E29A91635}" srcOrd="1" destOrd="0" presId="urn:microsoft.com/office/officeart/2005/8/layout/hierarchy3"/>
-    <dgm:cxn modelId="{A2D74A94-630F-4FD1-871D-72550A11A625}" type="presOf" srcId="{FA48EDC7-D956-466E-9D0A-B85785DF45A4}" destId="{6D432BDD-A9CA-47AC-A00A-7AE9F0834888}" srcOrd="0" destOrd="0" presId="urn:microsoft.com/office/officeart/2005/8/layout/hierarchy3"/>
-    <dgm:cxn modelId="{7FA8F6FD-932D-4C87-BC75-94BCD31DD751}" srcId="{3F4673CF-9B3B-4509-97DD-A22B66C3824F}" destId="{AD02BC3D-85A1-4FD1-B8BA-B6C453BDAD22}" srcOrd="1" destOrd="0" parTransId="{AD124901-5198-4D50-A3F9-8BE5ADB951C7}" sibTransId="{5F215F94-D3A9-405F-8A13-520CF9607BFB}"/>
-    <dgm:cxn modelId="{3D6148D6-E580-44C1-9DA5-664D2879479D}" srcId="{3F4673CF-9B3B-4509-97DD-A22B66C3824F}" destId="{A5DCF514-2A8A-4627-A19A-E67934107F5F}" srcOrd="0" destOrd="0" parTransId="{BB527F04-0AA1-439B-92FB-8427C3A8E8F8}" sibTransId="{28774637-A124-4690-BA71-982CDADC1ACA}"/>
-    <dgm:cxn modelId="{598EBF17-5C67-43EC-947F-914DDF9806EF}" type="presOf" srcId="{A8BF65B2-971A-4FB1-84FF-B32C5A517CA6}" destId="{695E4BA9-9902-44F2-BE36-DD64A9BBB0CB}" srcOrd="0" destOrd="0" presId="urn:microsoft.com/office/officeart/2005/8/layout/hierarchy3"/>
-    <dgm:cxn modelId="{EECC2B04-E1D4-4775-84BB-EEFD3E6BE457}" type="presOf" srcId="{6504BF02-88E9-4F44-85EE-8080CFB2D5FD}" destId="{87AEBA47-E91F-4D35-87F2-A87C9F675F79}" srcOrd="0" destOrd="0" presId="urn:microsoft.com/office/officeart/2005/8/layout/hierarchy3"/>
-    <dgm:cxn modelId="{5952A636-7869-4C33-8124-EB5CE378CAAD}" type="presOf" srcId="{8A2ADFF1-ECFC-4CE2-8A43-3E5393E9CA78}" destId="{B71426A2-5D08-4695-9DB8-F4830DAE19B4}" srcOrd="0" destOrd="0" presId="urn:microsoft.com/office/officeart/2005/8/layout/hierarchy3"/>
-    <dgm:cxn modelId="{D444824F-3A97-4C00-BF1A-ABEDF95204E0}" type="presOf" srcId="{A5DCF514-2A8A-4627-A19A-E67934107F5F}" destId="{48C06D2F-723A-4C73-9A80-49845654B909}" srcOrd="0" destOrd="0" presId="urn:microsoft.com/office/officeart/2005/8/layout/hierarchy3"/>
-    <dgm:cxn modelId="{7D1EF343-A334-4E05-91EF-49F73665A73B}" srcId="{8A2ADFF1-ECFC-4CE2-8A43-3E5393E9CA78}" destId="{9AA46DBE-102B-43BE-99EA-AD0C8020ACBA}" srcOrd="4" destOrd="0" parTransId="{9FEBE1C5-ECB9-432F-8C59-2760D9804B0F}" sibTransId="{94AA3C68-CE5E-4BC6-8F20-8DD4A6CE690B}"/>
-    <dgm:cxn modelId="{5F9438F9-F165-456A-A4D5-02363B197DCE}" type="presOf" srcId="{979C4618-D401-4827-9E28-71C511CFDBF0}" destId="{7D787CB7-AF7D-4FED-AE72-AD01A99E42F3}" srcOrd="0" destOrd="0" presId="urn:microsoft.com/office/officeart/2005/8/layout/hierarchy3"/>
-    <dgm:cxn modelId="{7BE61171-5591-4162-9345-02847A483D80}" srcId="{3F4673CF-9B3B-4509-97DD-A22B66C3824F}" destId="{15483F0D-B987-48C5-A922-9265109DD868}" srcOrd="2" destOrd="0" parTransId="{1F0D7478-45F7-470E-8F78-E3E2686DB277}" sibTransId="{077B4879-B76D-4951-B47E-28AA24DDCF35}"/>
-    <dgm:cxn modelId="{3728D680-8635-4746-804D-0CFF957E1E1F}" type="presOf" srcId="{78A695BB-F21E-4EC9-9686-793E406DF3A4}" destId="{D34B5699-D55F-4F8B-B13B-26D3EC131D3E}" srcOrd="0" destOrd="0" presId="urn:microsoft.com/office/officeart/2005/8/layout/hierarchy3"/>
-    <dgm:cxn modelId="{47DC1FE2-8990-4504-B026-C68A21CBBD0F}" type="presOf" srcId="{99208F80-8297-46D6-9DE5-87AE02B48845}" destId="{4A2DBB50-DE27-4A15-BBE2-F762735D8066}" srcOrd="0" destOrd="0" presId="urn:microsoft.com/office/officeart/2005/8/layout/hierarchy3"/>
-    <dgm:cxn modelId="{F40C2093-2CE1-4BF7-B261-02F66B0BB279}" type="presOf" srcId="{A1C29EDB-36D9-4D7D-8833-F6FEE36AB395}" destId="{6C224533-A8EA-490D-A1A9-E747AD688459}" srcOrd="0" destOrd="0" presId="urn:microsoft.com/office/officeart/2005/8/layout/hierarchy3"/>
-    <dgm:cxn modelId="{8D048F1E-8199-4951-853C-B8279D9ECCD9}" type="presOf" srcId="{31723623-2907-40BD-B4A4-97AC62D93EE0}" destId="{7B4592B8-D644-462B-BB83-9DBA4080A9C9}" srcOrd="0" destOrd="0" presId="urn:microsoft.com/office/officeart/2005/8/layout/hierarchy3"/>
-    <dgm:cxn modelId="{1FE85BC8-443E-40E7-8CB4-53D17C13B33E}" type="presOf" srcId="{78A695BB-F21E-4EC9-9686-793E406DF3A4}" destId="{08056D84-147F-469A-B3B6-C5B375730299}" srcOrd="1" destOrd="0" presId="urn:microsoft.com/office/officeart/2005/8/layout/hierarchy3"/>
-    <dgm:cxn modelId="{CB79CC9C-588A-4CBD-AEC1-36DADCAC3C18}" type="presOf" srcId="{2044B8BC-4BE9-4921-85E0-184354AEE613}" destId="{E5267F8B-006B-49E3-9CD7-7225B82D891A}" srcOrd="1" destOrd="0" presId="urn:microsoft.com/office/officeart/2005/8/layout/hierarchy3"/>
-    <dgm:cxn modelId="{6C4668CF-A6C1-4F90-B0E7-B7B08ADAD1B8}" type="presOf" srcId="{A4B71636-E8F3-4FE3-B960-84209B4D8D49}" destId="{01404DA1-4B6B-4D88-B729-4EB65C080AEB}" srcOrd="0" destOrd="0" presId="urn:microsoft.com/office/officeart/2005/8/layout/hierarchy3"/>
-    <dgm:cxn modelId="{F4494392-1D4D-473C-A7EE-D2598D470353}" srcId="{78A695BB-F21E-4EC9-9686-793E406DF3A4}" destId="{662E6787-133E-44DE-AFB1-2EE48CED900E}" srcOrd="2" destOrd="0" parTransId="{9F14C13A-6FC2-4D98-AE2D-9A93C207FDC4}" sibTransId="{F2BB7FDE-186F-47DF-B22A-8ACA6E8361CB}"/>
-    <dgm:cxn modelId="{A92418FB-F5C5-432B-B761-FE4BC65475D1}" type="presOf" srcId="{CC65F3DC-6B4F-4534-8DAE-7A1C12ACFFF7}" destId="{1D8A01CF-79D9-425A-8D46-E0C2FCC5236C}" srcOrd="0" destOrd="0" presId="urn:microsoft.com/office/officeart/2005/8/layout/hierarchy3"/>
-    <dgm:cxn modelId="{2E19CD03-B3AC-4E3D-A5C7-87B539AB5DE9}" srcId="{9AA46DBE-102B-43BE-99EA-AD0C8020ACBA}" destId="{8474DBC0-4762-444F-B4FD-01D6B61C322C}" srcOrd="0" destOrd="0" parTransId="{979C4618-D401-4827-9E28-71C511CFDBF0}" sibTransId="{4B41B8D2-0085-485A-A2DE-86C7882E9251}"/>
-    <dgm:cxn modelId="{BC642D7B-B0F4-491C-99A8-CC2DEA4B5D7F}" srcId="{8A2ADFF1-ECFC-4CE2-8A43-3E5393E9CA78}" destId="{3F4673CF-9B3B-4509-97DD-A22B66C3824F}" srcOrd="2" destOrd="0" parTransId="{9BFFFDD3-D7D9-47F0-9C62-268CF28FAC27}" sibTransId="{8B313A6A-5A13-4E81-9717-5A9FE2942BCC}"/>
-    <dgm:cxn modelId="{BA10AF30-0369-4280-9E72-074CAB53D3AD}" type="presOf" srcId="{669FBD19-B57A-47FC-AF73-4AC78B12256A}" destId="{C3C76811-CC02-4B22-9559-E9FD4F30BEBA}" srcOrd="0" destOrd="0" presId="urn:microsoft.com/office/officeart/2005/8/layout/hierarchy3"/>
-    <dgm:cxn modelId="{AB541539-C8D1-4D23-BC66-D34AD61035C1}" type="presOf" srcId="{2044B8BC-4BE9-4921-85E0-184354AEE613}" destId="{9854BD13-45B8-4BD3-886D-2D076B31BDA4}" srcOrd="0" destOrd="0" presId="urn:microsoft.com/office/officeart/2005/8/layout/hierarchy3"/>
-    <dgm:cxn modelId="{9AE6C1E3-92D4-447B-A13C-C327E4F7E129}" srcId="{78A695BB-F21E-4EC9-9686-793E406DF3A4}" destId="{FA48EDC7-D956-466E-9D0A-B85785DF45A4}" srcOrd="0" destOrd="0" parTransId="{A4B71636-E8F3-4FE3-B960-84209B4D8D49}" sibTransId="{DDC30FA1-CCA7-4F13-A4C7-407C3E1B04DF}"/>
-    <dgm:cxn modelId="{DD0F0C9F-E1AB-4BD3-92E6-DF786BDCE60E}" srcId="{2044B8BC-4BE9-4921-85E0-184354AEE613}" destId="{6504BF02-88E9-4F44-85EE-8080CFB2D5FD}" srcOrd="1" destOrd="0" parTransId="{31723623-2907-40BD-B4A4-97AC62D93EE0}" sibTransId="{E38F242A-98AD-4019-BBD9-2DE6BF830270}"/>
     <dgm:cxn modelId="{66780AD2-4BB7-40E1-93D2-F5E2479666FC}" type="presParOf" srcId="{B71426A2-5D08-4695-9DB8-F4830DAE19B4}" destId="{996C7C63-AC7A-47A0-AADF-F7A7E0325276}" srcOrd="0" destOrd="0" presId="urn:microsoft.com/office/officeart/2005/8/layout/hierarchy3"/>
     <dgm:cxn modelId="{954DD5EB-7EDA-4B0D-9B94-775629A67B03}" type="presParOf" srcId="{996C7C63-AC7A-47A0-AADF-F7A7E0325276}" destId="{42BC651E-FDE6-4492-B80E-DC14621A1EF4}" srcOrd="0" destOrd="0" presId="urn:microsoft.com/office/officeart/2005/8/layout/hierarchy3"/>
     <dgm:cxn modelId="{A5843716-4225-4495-A4A5-9142790B0962}" type="presParOf" srcId="{42BC651E-FDE6-4492-B80E-DC14621A1EF4}" destId="{1D8A01CF-79D9-425A-8D46-E0C2FCC5236C}" srcOrd="0" destOrd="0" presId="urn:microsoft.com/office/officeart/2005/8/layout/hierarchy3"/>
@@ -28692,7 +28693,7 @@
             <a:fld id="{B61BEF0D-F0BB-DE4B-95CE-6DB70DBA9567}" type="datetimeFigureOut">
               <a:rPr lang="en-US" smtClean="0"/>
               <a:pPr/>
-              <a:t>2/7/2022</a:t>
+              <a:t>2/8/2022</a:t>
             </a:fld>
             <a:endParaRPr lang="en-US" dirty="0"/>
           </a:p>
@@ -29130,7 +29131,7 @@
             <a:fld id="{B61BEF0D-F0BB-DE4B-95CE-6DB70DBA9567}" type="datetimeFigureOut">
               <a:rPr lang="en-US" smtClean="0"/>
               <a:pPr/>
-              <a:t>2/7/2022</a:t>
+              <a:t>2/8/2022</a:t>
             </a:fld>
             <a:endParaRPr lang="en-US" dirty="0"/>
           </a:p>
@@ -29382,7 +29383,7 @@
             <a:fld id="{B61BEF0D-F0BB-DE4B-95CE-6DB70DBA9567}" type="datetimeFigureOut">
               <a:rPr lang="en-US" smtClean="0"/>
               <a:pPr/>
-              <a:t>2/7/2022</a:t>
+              <a:t>2/8/2022</a:t>
             </a:fld>
             <a:endParaRPr lang="en-US" dirty="0"/>
           </a:p>
@@ -29692,7 +29693,7 @@
             <a:fld id="{B61BEF0D-F0BB-DE4B-95CE-6DB70DBA9567}" type="datetimeFigureOut">
               <a:rPr lang="en-US" smtClean="0"/>
               <a:pPr/>
-              <a:t>2/7/2022</a:t>
+              <a:t>2/8/2022</a:t>
             </a:fld>
             <a:endParaRPr lang="en-US" dirty="0"/>
           </a:p>
@@ -30012,7 +30013,7 @@
             <a:fld id="{B61BEF0D-F0BB-DE4B-95CE-6DB70DBA9567}" type="datetimeFigureOut">
               <a:rPr lang="en-US" smtClean="0"/>
               <a:pPr/>
-              <a:t>2/7/2022</a:t>
+              <a:t>2/8/2022</a:t>
             </a:fld>
             <a:endParaRPr lang="en-US" dirty="0"/>
           </a:p>
@@ -30316,7 +30317,7 @@
             <a:fld id="{B61BEF0D-F0BB-DE4B-95CE-6DB70DBA9567}" type="datetimeFigureOut">
               <a:rPr lang="en-US" smtClean="0"/>
               <a:pPr/>
-              <a:t>2/7/2022</a:t>
+              <a:t>2/8/2022</a:t>
             </a:fld>
             <a:endParaRPr lang="en-US" dirty="0"/>
           </a:p>
@@ -30685,7 +30686,7 @@
             <a:fld id="{B61BEF0D-F0BB-DE4B-95CE-6DB70DBA9567}" type="datetimeFigureOut">
               <a:rPr lang="en-US" smtClean="0"/>
               <a:pPr/>
-              <a:t>2/7/2022</a:t>
+              <a:t>2/8/2022</a:t>
             </a:fld>
             <a:endParaRPr lang="en-US" dirty="0"/>
           </a:p>
@@ -30861,7 +30862,7 @@
             <a:fld id="{B61BEF0D-F0BB-DE4B-95CE-6DB70DBA9567}" type="datetimeFigureOut">
               <a:rPr lang="en-US" smtClean="0"/>
               <a:pPr/>
-              <a:t>2/7/2022</a:t>
+              <a:t>2/8/2022</a:t>
             </a:fld>
             <a:endParaRPr lang="en-US" dirty="0"/>
           </a:p>
@@ -31043,7 +31044,7 @@
             <a:fld id="{B61BEF0D-F0BB-DE4B-95CE-6DB70DBA9567}" type="datetimeFigureOut">
               <a:rPr lang="en-US" smtClean="0"/>
               <a:pPr/>
-              <a:t>2/7/2022</a:t>
+              <a:t>2/8/2022</a:t>
             </a:fld>
             <a:endParaRPr lang="en-US" dirty="0"/>
           </a:p>
@@ -31215,7 +31216,7 @@
             <a:fld id="{B61BEF0D-F0BB-DE4B-95CE-6DB70DBA9567}" type="datetimeFigureOut">
               <a:rPr lang="en-US" smtClean="0"/>
               <a:pPr/>
-              <a:t>2/7/2022</a:t>
+              <a:t>2/8/2022</a:t>
             </a:fld>
             <a:endParaRPr lang="en-US" dirty="0"/>
           </a:p>
@@ -31467,7 +31468,7 @@
             <a:fld id="{B61BEF0D-F0BB-DE4B-95CE-6DB70DBA9567}" type="datetimeFigureOut">
               <a:rPr lang="en-US" smtClean="0"/>
               <a:pPr/>
-              <a:t>2/7/2022</a:t>
+              <a:t>2/8/2022</a:t>
             </a:fld>
             <a:endParaRPr lang="en-US" dirty="0"/>
           </a:p>
@@ -31705,7 +31706,7 @@
             <a:fld id="{B61BEF0D-F0BB-DE4B-95CE-6DB70DBA9567}" type="datetimeFigureOut">
               <a:rPr lang="en-US" smtClean="0"/>
               <a:pPr/>
-              <a:t>2/7/2022</a:t>
+              <a:t>2/8/2022</a:t>
             </a:fld>
             <a:endParaRPr lang="en-US" dirty="0"/>
           </a:p>
@@ -32089,7 +32090,7 @@
             <a:fld id="{B61BEF0D-F0BB-DE4B-95CE-6DB70DBA9567}" type="datetimeFigureOut">
               <a:rPr lang="en-US" smtClean="0"/>
               <a:pPr/>
-              <a:t>2/7/2022</a:t>
+              <a:t>2/8/2022</a:t>
             </a:fld>
             <a:endParaRPr lang="en-US" dirty="0"/>
           </a:p>
@@ -32209,7 +32210,7 @@
             <a:fld id="{B61BEF0D-F0BB-DE4B-95CE-6DB70DBA9567}" type="datetimeFigureOut">
               <a:rPr lang="en-US" smtClean="0"/>
               <a:pPr/>
-              <a:t>2/7/2022</a:t>
+              <a:t>2/8/2022</a:t>
             </a:fld>
             <a:endParaRPr lang="en-US" dirty="0"/>
           </a:p>
@@ -32306,7 +32307,7 @@
             <a:fld id="{B61BEF0D-F0BB-DE4B-95CE-6DB70DBA9567}" type="datetimeFigureOut">
               <a:rPr lang="en-US" smtClean="0"/>
               <a:pPr/>
-              <a:t>2/7/2022</a:t>
+              <a:t>2/8/2022</a:t>
             </a:fld>
             <a:endParaRPr lang="en-US" dirty="0"/>
           </a:p>
@@ -32563,7 +32564,7 @@
             <a:fld id="{B61BEF0D-F0BB-DE4B-95CE-6DB70DBA9567}" type="datetimeFigureOut">
               <a:rPr lang="en-US" smtClean="0"/>
               <a:pPr/>
-              <a:t>2/7/2022</a:t>
+              <a:t>2/8/2022</a:t>
             </a:fld>
             <a:endParaRPr lang="en-US" dirty="0"/>
           </a:p>
@@ -32848,7 +32849,7 @@
             <a:fld id="{B61BEF0D-F0BB-DE4B-95CE-6DB70DBA9567}" type="datetimeFigureOut">
               <a:rPr lang="en-US" smtClean="0"/>
               <a:pPr/>
-              <a:t>2/7/2022</a:t>
+              <a:t>2/8/2022</a:t>
             </a:fld>
             <a:endParaRPr lang="en-US" dirty="0"/>
           </a:p>
@@ -33256,7 +33257,7 @@
             <a:fld id="{B61BEF0D-F0BB-DE4B-95CE-6DB70DBA9567}" type="datetimeFigureOut">
               <a:rPr lang="en-US" smtClean="0"/>
               <a:pPr/>
-              <a:t>2/7/2022</a:t>
+              <a:t>2/8/2022</a:t>
             </a:fld>
             <a:endParaRPr lang="en-US" dirty="0"/>
           </a:p>
@@ -34394,6 +34395,141 @@
 </p:sld>
 </file>
 
+<file path=ppt/slides/slide13.xml><?xml version="1.0" encoding="utf-8"?>
+<p:sld xmlns:a="http://schemas.openxmlformats.org/drawingml/2006/main" xmlns:r="http://schemas.openxmlformats.org/officeDocument/2006/relationships" xmlns:p="http://schemas.openxmlformats.org/presentationml/2006/main">
+  <p:cSld>
+    <p:spTree>
+      <p:nvGrpSpPr>
+        <p:cNvPr id="1" name=""/>
+        <p:cNvGrpSpPr/>
+        <p:nvPr/>
+      </p:nvGrpSpPr>
+      <p:grpSpPr>
+        <a:xfrm>
+          <a:off x="0" y="0"/>
+          <a:ext cx="0" cy="0"/>
+          <a:chOff x="0" y="0"/>
+          <a:chExt cx="0" cy="0"/>
+        </a:xfrm>
+      </p:grpSpPr>
+      <p:pic>
+        <p:nvPicPr>
+          <p:cNvPr id="6" name="Объект 5"/>
+          <p:cNvPicPr>
+            <a:picLocks noGrp="1" noChangeAspect="1"/>
+          </p:cNvPicPr>
+          <p:nvPr>
+            <p:ph idx="1"/>
+          </p:nvPr>
+        </p:nvPicPr>
+        <p:blipFill>
+          <a:blip r:embed="rId2">
+            <a:extLst>
+              <a:ext uri="{28A0092B-C50C-407E-A947-70E740481C1C}">
+                <a14:useLocalDpi xmlns:a14="http://schemas.microsoft.com/office/drawing/2010/main" val="0"/>
+              </a:ext>
+            </a:extLst>
+          </a:blip>
+          <a:stretch>
+            <a:fillRect/>
+          </a:stretch>
+        </p:blipFill>
+        <p:spPr>
+          <a:xfrm>
+            <a:off x="597949" y="234446"/>
+            <a:ext cx="8534400" cy="2861173"/>
+          </a:xfrm>
+        </p:spPr>
+      </p:pic>
+      <p:pic>
+        <p:nvPicPr>
+          <p:cNvPr id="7" name="Рисунок 6"/>
+          <p:cNvPicPr>
+            <a:picLocks noChangeAspect="1"/>
+          </p:cNvPicPr>
+          <p:nvPr/>
+        </p:nvPicPr>
+        <p:blipFill>
+          <a:blip r:embed="rId3">
+            <a:extLst>
+              <a:ext uri="{28A0092B-C50C-407E-A947-70E740481C1C}">
+                <a14:useLocalDpi xmlns:a14="http://schemas.microsoft.com/office/drawing/2010/main" val="0"/>
+              </a:ext>
+            </a:extLst>
+          </a:blip>
+          <a:stretch>
+            <a:fillRect/>
+          </a:stretch>
+        </p:blipFill>
+        <p:spPr>
+          <a:xfrm>
+            <a:off x="7161724" y="1177887"/>
+            <a:ext cx="4907705" cy="4450466"/>
+          </a:xfrm>
+          <a:prstGeom prst="rect">
+            <a:avLst/>
+          </a:prstGeom>
+        </p:spPr>
+      </p:pic>
+      <p:sp>
+        <p:nvSpPr>
+          <p:cNvPr id="8" name="Заголовок 1"/>
+          <p:cNvSpPr>
+            <a:spLocks noGrp="1"/>
+          </p:cNvSpPr>
+          <p:nvPr>
+            <p:ph type="title"/>
+          </p:nvPr>
+        </p:nvSpPr>
+        <p:spPr>
+          <a:xfrm>
+            <a:off x="123494" y="5874588"/>
+            <a:ext cx="8534400" cy="525252"/>
+          </a:xfrm>
+        </p:spPr>
+        <p:txBody>
+          <a:bodyPr>
+            <a:noAutofit/>
+          </a:bodyPr>
+          <a:lstStyle/>
+          <a:p>
+            <a:r>
+              <a:rPr lang="en-US" sz="2800" dirty="0" smtClean="0"/>
+              <a:t>Notification and pipeline with Jenkins file from </a:t>
+            </a:r>
+            <a:r>
+              <a:rPr lang="en-US" sz="2800" dirty="0" err="1" smtClean="0"/>
+              <a:t>github</a:t>
+            </a:r>
+            <a:r>
+              <a:rPr lang="en-US" sz="2800" dirty="0" smtClean="0"/>
+              <a:t>. Terraform state on </a:t>
+            </a:r>
+            <a:r>
+              <a:rPr lang="en-US" sz="2800" dirty="0" err="1" smtClean="0"/>
+              <a:t>aws</a:t>
+            </a:r>
+            <a:r>
+              <a:rPr lang="en-US" sz="2800" dirty="0" smtClean="0"/>
+              <a:t> s3</a:t>
+            </a:r>
+            <a:endParaRPr lang="uk-UA" sz="2800" dirty="0"/>
+          </a:p>
+        </p:txBody>
+      </p:sp>
+    </p:spTree>
+    <p:extLst>
+      <p:ext uri="{BB962C8B-B14F-4D97-AF65-F5344CB8AC3E}">
+        <p14:creationId xmlns:p14="http://schemas.microsoft.com/office/powerpoint/2010/main" val="853372594"/>
+      </p:ext>
+    </p:extLst>
+  </p:cSld>
+  <p:clrMapOvr>
+    <a:masterClrMapping/>
+  </p:clrMapOvr>
+</p:sld>
+</file>
+
 <file path=ppt/slides/slide2.xml><?xml version="1.0" encoding="utf-8"?>
 <p:sld xmlns:a="http://schemas.openxmlformats.org/drawingml/2006/main" xmlns:r="http://schemas.openxmlformats.org/officeDocument/2006/relationships" xmlns:p="http://schemas.openxmlformats.org/presentationml/2006/main">
   <p:cSld>
@@ -35034,15 +35170,7 @@
             </a:r>
             <a:r>
               <a:rPr lang="en-US" dirty="0" smtClean="0"/>
-              <a:t> for creation VM Ubuntu </a:t>
-            </a:r>
-            <a:r>
-              <a:rPr lang="en-US" dirty="0" smtClean="0"/>
-              <a:t>(my own image) with </a:t>
-            </a:r>
-            <a:r>
-              <a:rPr lang="en-US" dirty="0" smtClean="0"/>
-              <a:t>Terraform (step1). Then </a:t>
+              <a:t> for creation VM Ubuntu (my own image) with Terraform (step1). Then </a:t>
             </a:r>
             <a:r>
               <a:rPr lang="en-US" dirty="0"/>
@@ -35068,11 +35196,7 @@
             </a:r>
             <a:r>
               <a:rPr lang="en-US" dirty="0" smtClean="0"/>
-              <a:t> Jenkins (step3). </a:t>
-            </a:r>
-            <a:r>
-              <a:rPr lang="en-US" dirty="0" smtClean="0"/>
-              <a:t>Used next plugin: </a:t>
+              <a:t> Jenkins (step3). Used next plugin: </a:t>
             </a:r>
             <a:r>
               <a:rPr lang="en-US" dirty="0" err="1"/>

</xml_diff>